<commit_message>
Updates to Lab3 and Lab4
</commit_message>
<xml_diff>
--- a/Presentation/3 - LBG-AVDBicep-Build Day 2.pptx
+++ b/Presentation/3 - LBG-AVDBicep-Build Day 2.pptx
@@ -5,30 +5,29 @@
     <p:sldMasterId id="2147484229" r:id="rId4"/>
   </p:sldMasterIdLst>
   <p:notesMasterIdLst>
-    <p:notesMasterId r:id="rId23"/>
+    <p:notesMasterId r:id="rId22"/>
   </p:notesMasterIdLst>
   <p:handoutMasterIdLst>
-    <p:handoutMasterId r:id="rId24"/>
+    <p:handoutMasterId r:id="rId23"/>
   </p:handoutMasterIdLst>
   <p:sldIdLst>
     <p:sldId id="2076138452" r:id="rId5"/>
     <p:sldId id="2076138466" r:id="rId6"/>
     <p:sldId id="2076138467" r:id="rId7"/>
     <p:sldId id="2076138470" r:id="rId8"/>
-    <p:sldId id="2076138495" r:id="rId9"/>
-    <p:sldId id="2076138478" r:id="rId10"/>
-    <p:sldId id="2076138489" r:id="rId11"/>
-    <p:sldId id="2076138479" r:id="rId12"/>
-    <p:sldId id="2076138491" r:id="rId13"/>
-    <p:sldId id="2076138496" r:id="rId14"/>
-    <p:sldId id="2076138498" r:id="rId15"/>
-    <p:sldId id="2076138492" r:id="rId16"/>
-    <p:sldId id="2076138480" r:id="rId17"/>
-    <p:sldId id="2076138493" r:id="rId18"/>
-    <p:sldId id="2076138481" r:id="rId19"/>
-    <p:sldId id="2076138490" r:id="rId20"/>
-    <p:sldId id="2076138497" r:id="rId21"/>
-    <p:sldId id="2076138482" r:id="rId22"/>
+    <p:sldId id="2076138478" r:id="rId9"/>
+    <p:sldId id="2076138479" r:id="rId10"/>
+    <p:sldId id="2076138491" r:id="rId11"/>
+    <p:sldId id="2076138499" r:id="rId12"/>
+    <p:sldId id="2076138500" r:id="rId13"/>
+    <p:sldId id="2076138492" r:id="rId14"/>
+    <p:sldId id="2076138480" r:id="rId15"/>
+    <p:sldId id="2076138493" r:id="rId16"/>
+    <p:sldId id="2076138505" r:id="rId17"/>
+    <p:sldId id="2076138481" r:id="rId18"/>
+    <p:sldId id="2076138490" r:id="rId19"/>
+    <p:sldId id="2076138497" r:id="rId20"/>
+    <p:sldId id="2076138482" r:id="rId21"/>
   </p:sldIdLst>
   <p:sldSz cx="12192000" cy="6858000"/>
   <p:notesSz cx="6858000" cy="9144000"/>
@@ -252,7 +251,7 @@
               <a:rPr lang="en-US" smtClean="0">
                 <a:latin typeface="Segoe UI" pitchFamily="34" charset="0"/>
               </a:rPr>
-              <a:t>3/30/2023 8:20 AM</a:t>
+              <a:t>11/3/2023 7:34 AM</a:t>
             </a:fld>
             <a:endParaRPr lang="en-US" dirty="0">
               <a:latin typeface="Segoe UI" pitchFamily="34" charset="0"/>
@@ -530,7 +529,7 @@
           <a:p>
             <a:fld id="{386CE63F-9E7F-4C04-9D0D-FCA25A8E9E86}" type="datetime8">
               <a:rPr lang="en-US" smtClean="0"/>
-              <a:t>3/30/2023 8:19 AM</a:t>
+              <a:t>11/3/2023 7:33 AM</a:t>
             </a:fld>
             <a:endParaRPr lang="en-US" dirty="0"/>
           </a:p>
@@ -897,7 +896,7 @@
           <a:p>
             <a:fld id="{62C61DAB-D93E-49CA-B245-379601CFE8D0}" type="datetime8">
               <a:rPr lang="en-US" smtClean="0"/>
-              <a:t>3/30/2023 8:19 AM</a:t>
+              <a:t>11/3/2023 7:33 AM</a:t>
             </a:fld>
             <a:endParaRPr lang="en-US" dirty="0"/>
           </a:p>
@@ -1109,7 +1108,7 @@
           <a:p>
             <a:fld id="{386CE63F-9E7F-4C04-9D0D-FCA25A8E9E86}" type="datetime8">
               <a:rPr lang="en-US" smtClean="0"/>
-              <a:t>3/30/2023 1:02 PM</a:t>
+              <a:t>11/3/2023 7:33 AM</a:t>
             </a:fld>
             <a:endParaRPr lang="en-US" dirty="0"/>
           </a:p>
@@ -1133,7 +1132,7 @@
             <a:fld id="{B4008EB6-D09E-4580-8CD6-DDB14511944F}" type="slidenum">
               <a:rPr lang="en-US" smtClean="0"/>
               <a:pPr/>
-              <a:t>13</a:t>
+              <a:t>11</a:t>
             </a:fld>
             <a:endParaRPr lang="en-US" dirty="0"/>
           </a:p>
@@ -1274,7 +1273,7 @@
           <a:p>
             <a:fld id="{62C61DAB-D93E-49CA-B245-379601CFE8D0}" type="datetime8">
               <a:rPr lang="en-US" smtClean="0"/>
-              <a:t>3/30/2023 8:19 AM</a:t>
+              <a:t>11/3/2023 7:33 AM</a:t>
             </a:fld>
             <a:endParaRPr lang="en-US" dirty="0"/>
           </a:p>
@@ -1298,7 +1297,7 @@
             <a:fld id="{B4008EB6-D09E-4580-8CD6-DDB14511944F}" type="slidenum">
               <a:rPr lang="en-US" smtClean="0"/>
               <a:pPr/>
-              <a:t>18</a:t>
+              <a:t>17</a:t>
             </a:fld>
             <a:endParaRPr lang="en-US" dirty="0"/>
           </a:p>
@@ -55730,7 +55729,7 @@
             </a:br>
             <a:r>
               <a:rPr lang="en-US" sz="2800" dirty="0"/>
-              <a:t>AVD Bicep Workshop (2 days)</a:t>
+              <a:t>AVD Bicep Workshop (day 3)</a:t>
             </a:r>
             <a:endParaRPr lang="en-US" dirty="0"/>
           </a:p>
@@ -55826,7 +55825,7 @@
           <p:cNvPr id="2" name="Title 1">
             <a:extLst>
               <a:ext uri="{FF2B5EF4-FFF2-40B4-BE49-F238E27FC236}">
-                <a16:creationId xmlns:a16="http://schemas.microsoft.com/office/drawing/2014/main" id="{45124734-FB95-A835-30B7-B8CDC6BE1E64}"/>
+                <a16:creationId xmlns:a16="http://schemas.microsoft.com/office/drawing/2014/main" id="{2731C5BF-2587-AA43-8D00-4B95D90A112D}"/>
               </a:ext>
             </a:extLst>
           </p:cNvPr>
@@ -55843,8 +55842,8 @@
           <a:lstStyle/>
           <a:p>
             <a:r>
-              <a:rPr lang="en-GB" sz="2400" dirty="0"/>
-              <a:t>Lab 3 - Deploying your Bicep</a:t>
+              <a:rPr lang="en-US" sz="2800" dirty="0"/>
+              <a:t>Testing</a:t>
             </a:r>
           </a:p>
         </p:txBody>
@@ -55854,7 +55853,7 @@
           <p:cNvPr id="3" name="Text Placeholder 2">
             <a:extLst>
               <a:ext uri="{FF2B5EF4-FFF2-40B4-BE49-F238E27FC236}">
-                <a16:creationId xmlns:a16="http://schemas.microsoft.com/office/drawing/2014/main" id="{67298A08-5B4B-C9D0-F259-39415C03F45B}"/>
+                <a16:creationId xmlns:a16="http://schemas.microsoft.com/office/drawing/2014/main" id="{F39D18C1-892E-774C-A583-DD3BE9301A12}"/>
               </a:ext>
             </a:extLst>
           </p:cNvPr>
@@ -55874,8 +55873,8 @@
               <a:buNone/>
             </a:pPr>
             <a:r>
-              <a:rPr lang="en-GB" sz="2400" b="1" dirty="0"/>
-              <a:t>Deploying AVD</a:t>
+              <a:rPr lang="en-US" sz="2000" b="1" dirty="0"/>
+              <a:t>Testing your AVD</a:t>
             </a:r>
           </a:p>
           <a:p>
@@ -55883,25 +55882,54 @@
               <a:buNone/>
             </a:pPr>
             <a:r>
-              <a:rPr lang="en-GB" sz="2000" dirty="0"/>
-              <a:t>You will be a dab hand at this by now.  But as this is a new day, you may need to log back in to Azure</a:t>
-            </a:r>
+              <a:rPr lang="en-US" sz="2000" dirty="0"/>
+              <a:t>Make sure of the following:</a:t>
+            </a:r>
+          </a:p>
+          <a:p>
+            <a:pPr marL="457200" indent="-457200">
+              <a:buFont typeface="+mj-lt"/>
+              <a:buAutoNum type="arabicPeriod"/>
+            </a:pPr>
+            <a:r>
+              <a:rPr lang="en-US" sz="2000" dirty="0"/>
+              <a:t>You have hosts up and running</a:t>
+            </a:r>
+          </a:p>
+          <a:p>
+            <a:pPr marL="457200" indent="-457200">
+              <a:buFont typeface="+mj-lt"/>
+              <a:buAutoNum type="arabicPeriod"/>
+            </a:pPr>
+            <a:r>
+              <a:rPr lang="en-US" sz="2000" dirty="0"/>
+              <a:t>The hosts are visible in the host pool</a:t>
+            </a:r>
+          </a:p>
+          <a:p>
+            <a:pPr marL="457200" indent="-457200">
+              <a:buFont typeface="+mj-lt"/>
+              <a:buAutoNum type="arabicPeriod"/>
+            </a:pPr>
+            <a:r>
+              <a:rPr lang="en-US" sz="2000" dirty="0"/>
+              <a:t>The RBAC permissions have been set in the Application Group</a:t>
+            </a:r>
+          </a:p>
+          <a:p>
+            <a:pPr marL="457200" indent="-457200">
+              <a:buFont typeface="+mj-lt"/>
+              <a:buAutoNum type="arabicPeriod"/>
+            </a:pPr>
+            <a:endParaRPr lang="en-US" sz="2000" dirty="0"/>
           </a:p>
           <a:p>
             <a:pPr marL="0" indent="0">
               <a:buNone/>
             </a:pPr>
             <a:r>
-              <a:rPr lang="en-GB" sz="2000" dirty="0"/>
-              <a:t>As before, the script takes several parameters but now </a:t>
-            </a:r>
-            <a:r>
-              <a:rPr lang="en-GB" sz="2000" b="1" dirty="0"/>
-              <a:t>two</a:t>
-            </a:r>
-            <a:r>
-              <a:rPr lang="en-GB" sz="2000" dirty="0"/>
-              <a:t> are mandatory.</a:t>
+              <a:rPr lang="en-US" sz="2000" dirty="0"/>
+              <a:t>Then connect to:</a:t>
             </a:r>
           </a:p>
           <a:p>
@@ -55909,39 +55937,29 @@
               <a:buNone/>
             </a:pPr>
             <a:r>
-              <a:rPr lang="en-GB" sz="1800" b="1" i="1" dirty="0"/>
-              <a:t>.\deploy.ps1 -</a:t>
-            </a:r>
-            <a:r>
-              <a:rPr lang="en-GB" sz="1800" b="1" i="1" dirty="0" err="1"/>
-              <a:t>uniqueIdentifier</a:t>
-            </a:r>
-            <a:r>
-              <a:rPr lang="en-GB" sz="1800" b="1" i="1" dirty="0"/>
-              <a:t> “Provided unique ID" -</a:t>
-            </a:r>
-            <a:r>
-              <a:rPr lang="en-GB" sz="1800" b="1" i="1" dirty="0" err="1"/>
-              <a:t>avdVnetCIDR</a:t>
-            </a:r>
-            <a:r>
-              <a:rPr lang="en-GB" sz="1800" b="1" i="1" dirty="0"/>
-              <a:t> "provided CIDR“</a:t>
+              <a:rPr lang="en-US" sz="2000" dirty="0">
+                <a:hlinkClick r:id="rId2"/>
+              </a:rPr>
+              <a:t>https://client.wvd.microsoft.com/arm/webclient/index.html</a:t>
+            </a:r>
+            <a:r>
+              <a:rPr lang="en-US" sz="2000" dirty="0"/>
+              <a:t> </a:t>
             </a:r>
           </a:p>
           <a:p>
             <a:pPr marL="0" indent="0">
               <a:buNone/>
             </a:pPr>
-            <a:endParaRPr lang="en-GB" sz="1800" dirty="0"/>
+            <a:endParaRPr lang="en-US" sz="2000" dirty="0"/>
           </a:p>
           <a:p>
             <a:pPr marL="0" indent="0">
               <a:buNone/>
             </a:pPr>
             <a:r>
-              <a:rPr lang="en-GB" sz="1800" dirty="0"/>
-              <a:t>Notes:</a:t>
+              <a:rPr lang="en-US" sz="2000" dirty="0"/>
+              <a:t>You will be asked to log in – use the same credentials as you used for building.</a:t>
             </a:r>
           </a:p>
           <a:p>
@@ -55949,45 +55967,37 @@
               <a:buNone/>
             </a:pPr>
             <a:r>
-              <a:rPr lang="en-GB" sz="1800" b="1" u="sng" dirty="0"/>
-              <a:t>Always</a:t>
-            </a:r>
-            <a:r>
-              <a:rPr lang="en-GB" sz="1800" dirty="0"/>
-              <a:t> use the same </a:t>
-            </a:r>
-            <a:r>
-              <a:rPr lang="en-GB" sz="1800" b="1" dirty="0"/>
-              <a:t>CIDR</a:t>
-            </a:r>
-            <a:r>
-              <a:rPr lang="en-GB" sz="1800" dirty="0"/>
-              <a:t> and </a:t>
-            </a:r>
-            <a:r>
-              <a:rPr lang="en-GB" sz="1800" b="1" dirty="0"/>
-              <a:t>Unique ID </a:t>
-            </a:r>
-            <a:r>
-              <a:rPr lang="en-GB" sz="1800" dirty="0"/>
-              <a:t>when deploying to avoid conflicts.</a:t>
-            </a:r>
+              <a:rPr lang="en-US" sz="2000" dirty="0"/>
+              <a:t>If all was successful you will see a Workspace with a icon for “</a:t>
+            </a:r>
+            <a:r>
+              <a:rPr lang="en-US" sz="2000" dirty="0" err="1"/>
+              <a:t>SessionDesktop</a:t>
+            </a:r>
+            <a:r>
+              <a:rPr lang="en-US" sz="2000" dirty="0"/>
+              <a:t>”.  Click on it and log in.</a:t>
+            </a:r>
+          </a:p>
+          <a:p>
+            <a:pPr marL="457200" indent="-457200">
+              <a:buFont typeface="+mj-lt"/>
+              <a:buAutoNum type="arabicPeriod"/>
+            </a:pPr>
+            <a:endParaRPr lang="en-US" sz="2000" dirty="0"/>
           </a:p>
           <a:p>
             <a:pPr marL="0" indent="0">
               <a:buNone/>
             </a:pPr>
-            <a:r>
-              <a:rPr lang="en-GB" sz="1800" dirty="0"/>
-              <a:t>To save time, take a look at the README.md – it provides examples of some of the other parameters.</a:t>
-            </a:r>
+            <a:endParaRPr lang="en-US" sz="2000" dirty="0"/>
           </a:p>
         </p:txBody>
       </p:sp>
     </p:spTree>
     <p:extLst>
       <p:ext uri="{BB962C8B-B14F-4D97-AF65-F5344CB8AC3E}">
-        <p14:creationId xmlns:p14="http://schemas.microsoft.com/office/powerpoint/2010/main" val="248622134"/>
+        <p14:creationId xmlns:p14="http://schemas.microsoft.com/office/powerpoint/2010/main" val="1610496519"/>
       </p:ext>
     </p:extLst>
   </p:cSld>
@@ -56022,7 +56032,7 @@
           <p:cNvPr id="2" name="Title 1">
             <a:extLst>
               <a:ext uri="{FF2B5EF4-FFF2-40B4-BE49-F238E27FC236}">
-                <a16:creationId xmlns:a16="http://schemas.microsoft.com/office/drawing/2014/main" id="{2731C5BF-2587-AA43-8D00-4B95D90A112D}"/>
+                <a16:creationId xmlns:a16="http://schemas.microsoft.com/office/drawing/2014/main" id="{E9669AEF-D865-0342-AB7E-7902F83D5504}"/>
               </a:ext>
             </a:extLst>
           </p:cNvPr>
@@ -56033,15 +56043,34 @@
             <p:ph type="title"/>
           </p:nvPr>
         </p:nvSpPr>
-        <p:spPr/>
-        <p:txBody>
-          <a:bodyPr/>
+        <p:spPr>
+          <a:xfrm>
+            <a:off x="588263" y="585788"/>
+            <a:ext cx="4894962" cy="5683250"/>
+          </a:xfrm>
+        </p:spPr>
+        <p:txBody>
+          <a:bodyPr anchor="ctr">
+            <a:noAutofit/>
+          </a:bodyPr>
           <a:lstStyle/>
           <a:p>
+            <a:pPr algn="ctr"/>
             <a:r>
               <a:rPr lang="en-US" sz="2800" dirty="0"/>
-              <a:t>Lab 4 - AVD Hosts</a:t>
-            </a:r>
+              <a:t>Lunch</a:t>
+            </a:r>
+            <a:br>
+              <a:rPr lang="en-US" sz="2800" dirty="0"/>
+            </a:br>
+            <a:r>
+              <a:rPr lang="en-US" sz="2800" dirty="0"/>
+              <a:t>Back in 1 hour</a:t>
+            </a:r>
+            <a:br>
+              <a:rPr lang="en-US" sz="2800" dirty="0"/>
+            </a:br>
+            <a:endParaRPr lang="en-US" sz="2800" dirty="0"/>
           </a:p>
         </p:txBody>
       </p:sp>
@@ -56050,7 +56079,7 @@
           <p:cNvPr id="3" name="Text Placeholder 2">
             <a:extLst>
               <a:ext uri="{FF2B5EF4-FFF2-40B4-BE49-F238E27FC236}">
-                <a16:creationId xmlns:a16="http://schemas.microsoft.com/office/drawing/2014/main" id="{F39D18C1-892E-774C-A583-DD3BE9301A12}"/>
+                <a16:creationId xmlns:a16="http://schemas.microsoft.com/office/drawing/2014/main" id="{E243B9F1-DC42-0949-BC92-F7DEEDE03CC7}"/>
               </a:ext>
             </a:extLst>
           </p:cNvPr>
@@ -56063,85 +56092,28 @@
         </p:nvSpPr>
         <p:spPr/>
         <p:txBody>
-          <a:bodyPr/>
+          <a:bodyPr tIns="0" anchor="ctr">
+            <a:noAutofit/>
+          </a:bodyPr>
           <a:lstStyle/>
           <a:p>
-            <a:pPr marL="0" indent="0">
-              <a:buNone/>
-            </a:pPr>
-            <a:r>
-              <a:rPr lang="en-US" sz="2000" b="1" dirty="0"/>
-              <a:t>And finally, the action</a:t>
-            </a:r>
-          </a:p>
-          <a:p>
-            <a:pPr marL="0" indent="0">
-              <a:buNone/>
-            </a:pPr>
-            <a:r>
-              <a:rPr lang="en-US" sz="2000" dirty="0"/>
-              <a:t>You have worked hard to get to this point, now we just need to add some compute and a touch of configuration.  So in this Lab we will be doing the following:</a:t>
-            </a:r>
-          </a:p>
-          <a:p>
-            <a:pPr marL="457200" indent="-457200">
-              <a:buFont typeface="+mj-lt"/>
-              <a:buAutoNum type="arabicPeriod"/>
-            </a:pPr>
-            <a:r>
-              <a:rPr lang="en-US" sz="2000" dirty="0"/>
-              <a:t>Deploying some hosts</a:t>
-            </a:r>
-          </a:p>
-          <a:p>
-            <a:pPr marL="457200" indent="-457200">
-              <a:buFont typeface="+mj-lt"/>
-              <a:buAutoNum type="arabicPeriod"/>
-            </a:pPr>
-            <a:r>
-              <a:rPr lang="en-US" sz="2000" dirty="0"/>
-              <a:t>Connecting them to AD / AADDS</a:t>
-            </a:r>
-          </a:p>
-          <a:p>
-            <a:pPr marL="457200" indent="-457200">
-              <a:buFont typeface="+mj-lt"/>
-              <a:buAutoNum type="arabicPeriod"/>
-            </a:pPr>
-            <a:r>
-              <a:rPr lang="en-US" sz="2000" dirty="0"/>
-              <a:t>Running up some basic extensions</a:t>
-            </a:r>
-          </a:p>
-          <a:p>
-            <a:pPr marL="457200" indent="-457200">
-              <a:buFont typeface="+mj-lt"/>
-              <a:buAutoNum type="arabicPeriod"/>
-            </a:pPr>
-            <a:r>
-              <a:rPr lang="en-US" sz="2000" dirty="0"/>
-              <a:t>Logging into a desktop</a:t>
-            </a:r>
-          </a:p>
-          <a:p>
-            <a:pPr marL="457200" indent="-457200">
-              <a:buFont typeface="+mj-lt"/>
-              <a:buAutoNum type="arabicPeriod"/>
-            </a:pPr>
-            <a:endParaRPr lang="en-US" sz="2000" dirty="0"/>
-          </a:p>
-          <a:p>
-            <a:pPr marL="0" indent="0">
-              <a:buNone/>
-            </a:pPr>
-            <a:endParaRPr lang="en-US" sz="2000" dirty="0"/>
+            <a:r>
+              <a:rPr lang="en-GB" sz="2000" dirty="0"/>
+              <a:t>"Using Azure Bicep is like having a trusty sidekick that always has your back in the cloud development game. It's the Robin to your Batman, the Sam to your Frodo, the Watson to your Sherlock. With Bicep by your side, you can tackle complex cloud infrastructure challenges with ease, knowing that your sidekick has your back. And who knows, with Bicep in your toolbelt, you might just become the superhero of cloud development yourself!“</a:t>
+            </a:r>
+          </a:p>
+          <a:p>
+            <a:r>
+              <a:rPr lang="en-GB" sz="1400" dirty="0"/>
+              <a:t>Chat-GPT</a:t>
+            </a:r>
           </a:p>
         </p:txBody>
       </p:sp>
     </p:spTree>
     <p:extLst>
       <p:ext uri="{BB962C8B-B14F-4D97-AF65-F5344CB8AC3E}">
-        <p14:creationId xmlns:p14="http://schemas.microsoft.com/office/powerpoint/2010/main" val="754125961"/>
+        <p14:creationId xmlns:p14="http://schemas.microsoft.com/office/powerpoint/2010/main" val="2324441626"/>
       </p:ext>
     </p:extLst>
   </p:cSld>
@@ -56192,9 +56164,10 @@
           <a:bodyPr/>
           <a:lstStyle/>
           <a:p>
-            <a:r>
-              <a:rPr lang="en-US" sz="2800" dirty="0"/>
-              <a:t>Testing</a:t>
+            <a:pPr algn="ctr"/>
+            <a:r>
+              <a:rPr lang="en-US" sz="2400" dirty="0"/>
+              <a:t>Demos and Discussions</a:t>
             </a:r>
           </a:p>
         </p:txBody>
@@ -56225,7 +56198,7 @@
             </a:pPr>
             <a:r>
               <a:rPr lang="en-US" sz="2000" b="1" dirty="0"/>
-              <a:t>Testing your AVD</a:t>
+              <a:t>Over to you</a:t>
             </a:r>
           </a:p>
           <a:p>
@@ -56234,38 +56207,45 @@
             </a:pPr>
             <a:r>
               <a:rPr lang="en-US" sz="2000" dirty="0"/>
-              <a:t>Make sure of the following:</a:t>
-            </a:r>
-          </a:p>
-          <a:p>
-            <a:pPr marL="457200" indent="-457200">
-              <a:buFont typeface="+mj-lt"/>
-              <a:buAutoNum type="arabicPeriod"/>
+              <a:t>For the rest of the afternoon, we can look at any other elements of AVD that you want to cover.</a:t>
+            </a:r>
+          </a:p>
+          <a:p>
+            <a:pPr marL="0" indent="0">
+              <a:buNone/>
             </a:pPr>
             <a:r>
               <a:rPr lang="en-US" sz="2000" dirty="0"/>
-              <a:t>You have hosts up and running</a:t>
-            </a:r>
-          </a:p>
-          <a:p>
-            <a:pPr marL="457200" indent="-457200">
-              <a:buFont typeface="+mj-lt"/>
-              <a:buAutoNum type="arabicPeriod"/>
+              <a:t>Examples include:</a:t>
+            </a:r>
+          </a:p>
+          <a:p>
+            <a:r>
+              <a:rPr lang="en-US" sz="2000" dirty="0"/>
+              <a:t>Using a DevOps pipeline to deploy your code</a:t>
+            </a:r>
+          </a:p>
+          <a:p>
+            <a:r>
+              <a:rPr lang="en-US" sz="2000" dirty="0" err="1"/>
+              <a:t>FSLogix</a:t>
+            </a:r>
+            <a:endParaRPr lang="en-US" sz="2000" dirty="0"/>
+          </a:p>
+          <a:p>
+            <a:r>
+              <a:rPr lang="en-US" sz="2000" dirty="0"/>
+              <a:t>Walk through of the full code base</a:t>
+            </a:r>
+          </a:p>
+          <a:p>
+            <a:endParaRPr lang="en-US" sz="2000" dirty="0"/>
+          </a:p>
+          <a:p>
+            <a:pPr marL="0" indent="0">
+              <a:buNone/>
             </a:pPr>
-            <a:r>
-              <a:rPr lang="en-US" sz="2000" dirty="0"/>
-              <a:t>The hosts are visible in the host pool</a:t>
-            </a:r>
-          </a:p>
-          <a:p>
-            <a:pPr marL="457200" indent="-457200">
-              <a:buFont typeface="+mj-lt"/>
-              <a:buAutoNum type="arabicPeriod"/>
-            </a:pPr>
-            <a:r>
-              <a:rPr lang="en-US" sz="2000" dirty="0"/>
-              <a:t>The RBAC permissions have been set in the Application Group</a:t>
-            </a:r>
+            <a:endParaRPr lang="en-US" sz="2000" dirty="0"/>
           </a:p>
           <a:p>
             <a:pPr marL="457200" indent="-457200">
@@ -56278,69 +56258,6 @@
             <a:pPr marL="0" indent="0">
               <a:buNone/>
             </a:pPr>
-            <a:r>
-              <a:rPr lang="en-US" sz="2000" dirty="0"/>
-              <a:t>Then connect to:</a:t>
-            </a:r>
-          </a:p>
-          <a:p>
-            <a:pPr marL="0" indent="0">
-              <a:buNone/>
-            </a:pPr>
-            <a:r>
-              <a:rPr lang="en-US" sz="2000" dirty="0">
-                <a:hlinkClick r:id="rId2"/>
-              </a:rPr>
-              <a:t>https://client.wvd.microsoft.com/arm/webclient/index.html</a:t>
-            </a:r>
-            <a:r>
-              <a:rPr lang="en-US" sz="2000" dirty="0"/>
-              <a:t> </a:t>
-            </a:r>
-          </a:p>
-          <a:p>
-            <a:pPr marL="0" indent="0">
-              <a:buNone/>
-            </a:pPr>
-            <a:endParaRPr lang="en-US" sz="2000" dirty="0"/>
-          </a:p>
-          <a:p>
-            <a:pPr marL="0" indent="0">
-              <a:buNone/>
-            </a:pPr>
-            <a:r>
-              <a:rPr lang="en-US" sz="2000" dirty="0"/>
-              <a:t>You will be asked to log in – use the same credentials as you used for building.</a:t>
-            </a:r>
-          </a:p>
-          <a:p>
-            <a:pPr marL="0" indent="0">
-              <a:buNone/>
-            </a:pPr>
-            <a:r>
-              <a:rPr lang="en-US" sz="2000" dirty="0"/>
-              <a:t>If all was successful you will see a Workspace with a icon for “</a:t>
-            </a:r>
-            <a:r>
-              <a:rPr lang="en-US" sz="2000" dirty="0" err="1"/>
-              <a:t>SessionDesktop</a:t>
-            </a:r>
-            <a:r>
-              <a:rPr lang="en-US" sz="2000" dirty="0"/>
-              <a:t>”.  Click on it and log in.</a:t>
-            </a:r>
-          </a:p>
-          <a:p>
-            <a:pPr marL="457200" indent="-457200">
-              <a:buFont typeface="+mj-lt"/>
-              <a:buAutoNum type="arabicPeriod"/>
-            </a:pPr>
-            <a:endParaRPr lang="en-US" sz="2000" dirty="0"/>
-          </a:p>
-          <a:p>
-            <a:pPr marL="0" indent="0">
-              <a:buNone/>
-            </a:pPr>
             <a:endParaRPr lang="en-US" sz="2000" dirty="0"/>
           </a:p>
         </p:txBody>
@@ -56348,7 +56265,7 @@
     </p:spTree>
     <p:extLst>
       <p:ext uri="{BB962C8B-B14F-4D97-AF65-F5344CB8AC3E}">
-        <p14:creationId xmlns:p14="http://schemas.microsoft.com/office/powerpoint/2010/main" val="1610496519"/>
+        <p14:creationId xmlns:p14="http://schemas.microsoft.com/office/powerpoint/2010/main" val="925315993"/>
       </p:ext>
     </p:extLst>
   </p:cSld>
@@ -56378,12 +56295,41 @@
           <a:chExt cx="0" cy="0"/>
         </a:xfrm>
       </p:grpSpPr>
-      <p:sp>
-        <p:nvSpPr>
-          <p:cNvPr id="2" name="Title 1">
-            <a:extLst>
-              <a:ext uri="{FF2B5EF4-FFF2-40B4-BE49-F238E27FC236}">
-                <a16:creationId xmlns:a16="http://schemas.microsoft.com/office/drawing/2014/main" id="{E9669AEF-D865-0342-AB7E-7902F83D5504}"/>
+      <p:pic>
+        <p:nvPicPr>
+          <p:cNvPr id="5" name="Picture Placeholder 4" descr="Cross section of young plant and roots">
+            <a:extLst>
+              <a:ext uri="{FF2B5EF4-FFF2-40B4-BE49-F238E27FC236}">
+                <a16:creationId xmlns:a16="http://schemas.microsoft.com/office/drawing/2014/main" id="{2C4060EA-069F-2B44-8494-5642E84F01E0}"/>
+              </a:ext>
+            </a:extLst>
+          </p:cNvPr>
+          <p:cNvPicPr>
+            <a:picLocks noGrp="1" noChangeAspect="1"/>
+          </p:cNvPicPr>
+          <p:nvPr>
+            <p:ph type="pic" sz="quarter" idx="10"/>
+          </p:nvPr>
+        </p:nvPicPr>
+        <p:blipFill>
+          <a:blip r:embed="rId2"/>
+          <a:srcRect t="10629" b="10629"/>
+          <a:stretch/>
+        </p:blipFill>
+        <p:spPr>
+          <a:xfrm>
+            <a:off x="0" y="0"/>
+            <a:ext cx="12192000" cy="6858000"/>
+          </a:xfrm>
+          <a:noFill/>
+        </p:spPr>
+      </p:pic>
+      <p:sp>
+        <p:nvSpPr>
+          <p:cNvPr id="3" name="Title 2">
+            <a:extLst>
+              <a:ext uri="{FF2B5EF4-FFF2-40B4-BE49-F238E27FC236}">
+                <a16:creationId xmlns:a16="http://schemas.microsoft.com/office/drawing/2014/main" id="{A5A65929-7741-CE47-8BDB-61A1AD81F762}"/>
               </a:ext>
             </a:extLst>
           </p:cNvPr>
@@ -56396,73 +56342,19 @@
         </p:nvSpPr>
         <p:spPr>
           <a:xfrm>
-            <a:off x="588263" y="585788"/>
-            <a:ext cx="4894962" cy="5683250"/>
-          </a:xfrm>
-        </p:spPr>
-        <p:txBody>
-          <a:bodyPr anchor="ctr">
-            <a:noAutofit/>
+            <a:off x="0" y="3657600"/>
+            <a:ext cx="12192000" cy="3200400"/>
+          </a:xfrm>
+        </p:spPr>
+        <p:txBody>
+          <a:bodyPr wrap="square" anchor="b">
+            <a:normAutofit/>
           </a:bodyPr>
           <a:lstStyle/>
           <a:p>
-            <a:pPr algn="ctr"/>
-            <a:r>
-              <a:rPr lang="en-US" sz="2800" dirty="0"/>
-              <a:t>Lunch</a:t>
-            </a:r>
-            <a:br>
-              <a:rPr lang="en-US" sz="2800" dirty="0"/>
-            </a:br>
-            <a:r>
-              <a:rPr lang="en-US" sz="2800" dirty="0"/>
-              <a:t>Back in 1 hour</a:t>
-            </a:r>
-            <a:br>
-              <a:rPr lang="en-US" sz="2800" dirty="0"/>
-            </a:br>
-            <a:br>
-              <a:rPr lang="en-US" sz="2800" dirty="0"/>
-            </a:br>
-            <a:r>
-              <a:rPr lang="en-US" sz="2800" dirty="0"/>
-              <a:t>back at 13:10</a:t>
-            </a:r>
-          </a:p>
-        </p:txBody>
-      </p:sp>
-      <p:sp>
-        <p:nvSpPr>
-          <p:cNvPr id="3" name="Text Placeholder 2">
-            <a:extLst>
-              <a:ext uri="{FF2B5EF4-FFF2-40B4-BE49-F238E27FC236}">
-                <a16:creationId xmlns:a16="http://schemas.microsoft.com/office/drawing/2014/main" id="{E243B9F1-DC42-0949-BC92-F7DEEDE03CC7}"/>
-              </a:ext>
-            </a:extLst>
-          </p:cNvPr>
-          <p:cNvSpPr>
-            <a:spLocks noGrp="1"/>
-          </p:cNvSpPr>
-          <p:nvPr>
-            <p:ph type="body" sz="quarter" idx="11"/>
-          </p:nvPr>
-        </p:nvSpPr>
-        <p:spPr/>
-        <p:txBody>
-          <a:bodyPr tIns="0" anchor="ctr">
-            <a:noAutofit/>
-          </a:bodyPr>
-          <a:lstStyle/>
-          <a:p>
-            <a:r>
-              <a:rPr lang="en-GB" sz="2000" dirty="0"/>
-              <a:t>"Using Azure Bicep is like having a trusty sidekick that always has your back in the cloud development game. It's the Robin to your Batman, the Sam to your Frodo, the Watson to your Sherlock. With Bicep by your side, you can tackle complex cloud infrastructure challenges with ease, knowing that your sidekick has your back. And who knows, with Bicep in your toolbelt, you might just become the superhero of cloud development yourself!“</a:t>
-            </a:r>
-          </a:p>
-          <a:p>
-            <a:r>
-              <a:rPr lang="en-GB" sz="1400" dirty="0"/>
-              <a:t>Chat-GPT</a:t>
+            <a:r>
+              <a:rPr lang="en-US" dirty="0"/>
+              <a:t>Q&amp;A and Review</a:t>
             </a:r>
           </a:p>
         </p:txBody>
@@ -56470,7 +56362,7 @@
     </p:spTree>
     <p:extLst>
       <p:ext uri="{BB962C8B-B14F-4D97-AF65-F5344CB8AC3E}">
-        <p14:creationId xmlns:p14="http://schemas.microsoft.com/office/powerpoint/2010/main" val="2324441626"/>
+        <p14:creationId xmlns:p14="http://schemas.microsoft.com/office/powerpoint/2010/main" val="1553456255"/>
       </p:ext>
     </p:extLst>
   </p:cSld>
@@ -56505,7 +56397,7 @@
           <p:cNvPr id="2" name="Title 1">
             <a:extLst>
               <a:ext uri="{FF2B5EF4-FFF2-40B4-BE49-F238E27FC236}">
-                <a16:creationId xmlns:a16="http://schemas.microsoft.com/office/drawing/2014/main" id="{2731C5BF-2587-AA43-8D00-4B95D90A112D}"/>
+                <a16:creationId xmlns:a16="http://schemas.microsoft.com/office/drawing/2014/main" id="{E9669AEF-D865-0342-AB7E-7902F83D5504}"/>
               </a:ext>
             </a:extLst>
           </p:cNvPr>
@@ -56516,15 +56408,29 @@
             <p:ph type="title"/>
           </p:nvPr>
         </p:nvSpPr>
-        <p:spPr/>
-        <p:txBody>
-          <a:bodyPr/>
+        <p:spPr>
+          <a:xfrm>
+            <a:off x="588263" y="585788"/>
+            <a:ext cx="4894962" cy="5683250"/>
+          </a:xfrm>
+        </p:spPr>
+        <p:txBody>
+          <a:bodyPr anchor="ctr">
+            <a:noAutofit/>
+          </a:bodyPr>
           <a:lstStyle/>
           <a:p>
             <a:pPr algn="ctr"/>
             <a:r>
-              <a:rPr lang="en-US" sz="2400" dirty="0"/>
-              <a:t>Demos and Discussions</a:t>
+              <a:rPr lang="en-US" sz="2800" dirty="0"/>
+              <a:t>Break</a:t>
+            </a:r>
+            <a:br>
+              <a:rPr lang="en-US" sz="2800" dirty="0"/>
+            </a:br>
+            <a:r>
+              <a:rPr lang="en-US" sz="2800" dirty="0"/>
+              <a:t>Back in 15 mins</a:t>
             </a:r>
           </a:p>
         </p:txBody>
@@ -56534,7 +56440,7 @@
           <p:cNvPr id="3" name="Text Placeholder 2">
             <a:extLst>
               <a:ext uri="{FF2B5EF4-FFF2-40B4-BE49-F238E27FC236}">
-                <a16:creationId xmlns:a16="http://schemas.microsoft.com/office/drawing/2014/main" id="{F39D18C1-892E-774C-A583-DD3BE9301A12}"/>
+                <a16:creationId xmlns:a16="http://schemas.microsoft.com/office/drawing/2014/main" id="{E243B9F1-DC42-0949-BC92-F7DEEDE03CC7}"/>
               </a:ext>
             </a:extLst>
           </p:cNvPr>
@@ -56547,82 +56453,22 @@
         </p:nvSpPr>
         <p:spPr/>
         <p:txBody>
-          <a:bodyPr/>
+          <a:bodyPr tIns="0" anchor="ctr">
+            <a:noAutofit/>
+          </a:bodyPr>
           <a:lstStyle/>
           <a:p>
-            <a:pPr marL="0" indent="0">
-              <a:buNone/>
-            </a:pPr>
-            <a:r>
-              <a:rPr lang="en-US" sz="2000" b="1" dirty="0"/>
-              <a:t>Over to you</a:t>
-            </a:r>
-          </a:p>
-          <a:p>
-            <a:pPr marL="0" indent="0">
-              <a:buNone/>
-            </a:pPr>
-            <a:r>
-              <a:rPr lang="en-US" sz="2000" dirty="0"/>
-              <a:t>For the rest of the afternoon, we can look at any other elements of AVD that you want to cover.</a:t>
-            </a:r>
-          </a:p>
-          <a:p>
-            <a:pPr marL="0" indent="0">
-              <a:buNone/>
-            </a:pPr>
-            <a:r>
-              <a:rPr lang="en-US" sz="2000" dirty="0"/>
-              <a:t>Examples include:</a:t>
-            </a:r>
-          </a:p>
-          <a:p>
-            <a:r>
-              <a:rPr lang="en-US" sz="2000" dirty="0"/>
-              <a:t>Using a DevOps pipeline to deploy your code</a:t>
-            </a:r>
-          </a:p>
-          <a:p>
-            <a:r>
-              <a:rPr lang="en-US" sz="2000" dirty="0" err="1"/>
-              <a:t>FSLogix</a:t>
-            </a:r>
-            <a:endParaRPr lang="en-US" sz="2000" dirty="0"/>
-          </a:p>
-          <a:p>
-            <a:r>
-              <a:rPr lang="en-US" sz="2000" dirty="0"/>
-              <a:t>Walk through of the full code base</a:t>
-            </a:r>
-          </a:p>
-          <a:p>
-            <a:endParaRPr lang="en-US" sz="2000" dirty="0"/>
-          </a:p>
-          <a:p>
-            <a:pPr marL="0" indent="0">
-              <a:buNone/>
-            </a:pPr>
-            <a:endParaRPr lang="en-US" sz="2000" dirty="0"/>
-          </a:p>
-          <a:p>
-            <a:pPr marL="457200" indent="-457200">
-              <a:buFont typeface="+mj-lt"/>
-              <a:buAutoNum type="arabicPeriod"/>
-            </a:pPr>
-            <a:endParaRPr lang="en-US" sz="2000" dirty="0"/>
-          </a:p>
-          <a:p>
-            <a:pPr marL="0" indent="0">
-              <a:buNone/>
-            </a:pPr>
-            <a:endParaRPr lang="en-US" sz="2000" dirty="0"/>
+            <a:r>
+              <a:rPr lang="en-GB" sz="2000" dirty="0"/>
+              <a:t>"Developing with Azure Bicep is like having a cheat code for cloud infrastructure - it makes building, deploying, and managing your resources so much easier, you'll wonder how you ever did it without it.”</a:t>
+            </a:r>
           </a:p>
         </p:txBody>
       </p:sp>
     </p:spTree>
     <p:extLst>
       <p:ext uri="{BB962C8B-B14F-4D97-AF65-F5344CB8AC3E}">
-        <p14:creationId xmlns:p14="http://schemas.microsoft.com/office/powerpoint/2010/main" val="925315993"/>
+        <p14:creationId xmlns:p14="http://schemas.microsoft.com/office/powerpoint/2010/main" val="3474494383"/>
       </p:ext>
     </p:extLst>
   </p:cSld>
@@ -56657,7 +56503,7 @@
           <p:cNvPr id="2" name="Title 1">
             <a:extLst>
               <a:ext uri="{FF2B5EF4-FFF2-40B4-BE49-F238E27FC236}">
-                <a16:creationId xmlns:a16="http://schemas.microsoft.com/office/drawing/2014/main" id="{E9669AEF-D865-0342-AB7E-7902F83D5504}"/>
+                <a16:creationId xmlns:a16="http://schemas.microsoft.com/office/drawing/2014/main" id="{2731C5BF-2587-AA43-8D00-4B95D90A112D}"/>
               </a:ext>
             </a:extLst>
           </p:cNvPr>
@@ -56668,29 +56514,14 @@
             <p:ph type="title"/>
           </p:nvPr>
         </p:nvSpPr>
-        <p:spPr>
-          <a:xfrm>
-            <a:off x="588263" y="585788"/>
-            <a:ext cx="4894962" cy="5683250"/>
-          </a:xfrm>
-        </p:spPr>
-        <p:txBody>
-          <a:bodyPr anchor="ctr">
-            <a:noAutofit/>
-          </a:bodyPr>
+        <p:spPr/>
+        <p:txBody>
+          <a:bodyPr/>
           <a:lstStyle/>
           <a:p>
-            <a:pPr algn="ctr"/>
             <a:r>
               <a:rPr lang="en-US" sz="2800" dirty="0"/>
-              <a:t>Break</a:t>
-            </a:r>
-            <a:br>
-              <a:rPr lang="en-US" sz="2800" dirty="0"/>
-            </a:br>
-            <a:r>
-              <a:rPr lang="en-US" sz="2800" dirty="0"/>
-              <a:t>Back in 15 mins</a:t>
+              <a:t>Wrapping Up</a:t>
             </a:r>
           </a:p>
         </p:txBody>
@@ -56700,7 +56531,7 @@
           <p:cNvPr id="3" name="Text Placeholder 2">
             <a:extLst>
               <a:ext uri="{FF2B5EF4-FFF2-40B4-BE49-F238E27FC236}">
-                <a16:creationId xmlns:a16="http://schemas.microsoft.com/office/drawing/2014/main" id="{E243B9F1-DC42-0949-BC92-F7DEEDE03CC7}"/>
+                <a16:creationId xmlns:a16="http://schemas.microsoft.com/office/drawing/2014/main" id="{F39D18C1-892E-774C-A583-DD3BE9301A12}"/>
               </a:ext>
             </a:extLst>
           </p:cNvPr>
@@ -56713,22 +56544,95 @@
         </p:nvSpPr>
         <p:spPr/>
         <p:txBody>
-          <a:bodyPr tIns="0" anchor="ctr">
-            <a:noAutofit/>
-          </a:bodyPr>
+          <a:bodyPr/>
           <a:lstStyle/>
           <a:p>
-            <a:r>
-              <a:rPr lang="en-GB" sz="2000" dirty="0"/>
-              <a:t>"Developing with Azure Bicep is like having a cheat code for cloud infrastructure - it makes building, deploying, and managing your resources so much easier, you'll wonder how you ever did it without it.”</a:t>
-            </a:r>
+            <a:pPr marL="0" indent="0">
+              <a:buNone/>
+            </a:pPr>
+            <a:r>
+              <a:rPr lang="en-US" sz="2000" b="1" dirty="0"/>
+              <a:t>So what did we learn?</a:t>
+            </a:r>
+          </a:p>
+          <a:p>
+            <a:pPr marL="457200" indent="-457200">
+              <a:buFont typeface="+mj-lt"/>
+              <a:buAutoNum type="arabicPeriod"/>
+            </a:pPr>
+            <a:r>
+              <a:rPr lang="en-US" sz="2000" dirty="0"/>
+              <a:t>The structure of a typical AVD deployment</a:t>
+            </a:r>
+          </a:p>
+          <a:p>
+            <a:pPr marL="457200" indent="-457200">
+              <a:buFont typeface="+mj-lt"/>
+              <a:buAutoNum type="arabicPeriod"/>
+            </a:pPr>
+            <a:r>
+              <a:rPr lang="en-US" sz="2000" dirty="0"/>
+              <a:t>The required resources to make it work</a:t>
+            </a:r>
+          </a:p>
+          <a:p>
+            <a:pPr marL="457200" indent="-457200">
+              <a:buFont typeface="+mj-lt"/>
+              <a:buAutoNum type="arabicPeriod"/>
+            </a:pPr>
+            <a:r>
+              <a:rPr lang="en-US" sz="2000" dirty="0"/>
+              <a:t>The </a:t>
+            </a:r>
+            <a:r>
+              <a:rPr lang="en-US" sz="2000" dirty="0" err="1"/>
+              <a:t>IaC</a:t>
+            </a:r>
+            <a:r>
+              <a:rPr lang="en-US" sz="2000" dirty="0"/>
+              <a:t> Bicep content for each resource</a:t>
+            </a:r>
+          </a:p>
+          <a:p>
+            <a:pPr marL="457200" indent="-457200">
+              <a:buFont typeface="+mj-lt"/>
+              <a:buAutoNum type="arabicPeriod"/>
+            </a:pPr>
+            <a:r>
+              <a:rPr lang="en-US" sz="2000" dirty="0"/>
+              <a:t>How all that Bicep code work together</a:t>
+            </a:r>
+          </a:p>
+          <a:p>
+            <a:pPr marL="457200" indent="-457200">
+              <a:buFont typeface="+mj-lt"/>
+              <a:buAutoNum type="arabicPeriod"/>
+            </a:pPr>
+            <a:r>
+              <a:rPr lang="en-US" sz="2000" dirty="0"/>
+              <a:t>How to deploy it all using a </a:t>
+            </a:r>
+            <a:r>
+              <a:rPr lang="en-US" sz="2000" dirty="0" err="1"/>
+              <a:t>powershell</a:t>
+            </a:r>
+            <a:r>
+              <a:rPr lang="en-US" sz="2000" dirty="0"/>
+              <a:t> script</a:t>
+            </a:r>
+          </a:p>
+          <a:p>
+            <a:pPr marL="0" indent="0">
+              <a:buNone/>
+            </a:pPr>
+            <a:endParaRPr lang="en-US" sz="2000" dirty="0"/>
           </a:p>
         </p:txBody>
       </p:sp>
     </p:spTree>
     <p:extLst>
       <p:ext uri="{BB962C8B-B14F-4D97-AF65-F5344CB8AC3E}">
-        <p14:creationId xmlns:p14="http://schemas.microsoft.com/office/powerpoint/2010/main" val="3474494383"/>
+        <p14:creationId xmlns:p14="http://schemas.microsoft.com/office/powerpoint/2010/main" val="4198896886"/>
       </p:ext>
     </p:extLst>
   </p:cSld>
@@ -56763,170 +56667,6 @@
           <p:cNvPr id="2" name="Title 1">
             <a:extLst>
               <a:ext uri="{FF2B5EF4-FFF2-40B4-BE49-F238E27FC236}">
-                <a16:creationId xmlns:a16="http://schemas.microsoft.com/office/drawing/2014/main" id="{2731C5BF-2587-AA43-8D00-4B95D90A112D}"/>
-              </a:ext>
-            </a:extLst>
-          </p:cNvPr>
-          <p:cNvSpPr>
-            <a:spLocks noGrp="1"/>
-          </p:cNvSpPr>
-          <p:nvPr>
-            <p:ph type="title"/>
-          </p:nvPr>
-        </p:nvSpPr>
-        <p:spPr/>
-        <p:txBody>
-          <a:bodyPr/>
-          <a:lstStyle/>
-          <a:p>
-            <a:r>
-              <a:rPr lang="en-US" sz="2800" dirty="0"/>
-              <a:t>Wrapping Up</a:t>
-            </a:r>
-          </a:p>
-        </p:txBody>
-      </p:sp>
-      <p:sp>
-        <p:nvSpPr>
-          <p:cNvPr id="3" name="Text Placeholder 2">
-            <a:extLst>
-              <a:ext uri="{FF2B5EF4-FFF2-40B4-BE49-F238E27FC236}">
-                <a16:creationId xmlns:a16="http://schemas.microsoft.com/office/drawing/2014/main" id="{F39D18C1-892E-774C-A583-DD3BE9301A12}"/>
-              </a:ext>
-            </a:extLst>
-          </p:cNvPr>
-          <p:cNvSpPr>
-            <a:spLocks noGrp="1"/>
-          </p:cNvSpPr>
-          <p:nvPr>
-            <p:ph type="body" sz="quarter" idx="11"/>
-          </p:nvPr>
-        </p:nvSpPr>
-        <p:spPr/>
-        <p:txBody>
-          <a:bodyPr/>
-          <a:lstStyle/>
-          <a:p>
-            <a:pPr marL="0" indent="0">
-              <a:buNone/>
-            </a:pPr>
-            <a:r>
-              <a:rPr lang="en-US" sz="2000" b="1" dirty="0"/>
-              <a:t>So what did we learn?</a:t>
-            </a:r>
-          </a:p>
-          <a:p>
-            <a:pPr marL="457200" indent="-457200">
-              <a:buFont typeface="+mj-lt"/>
-              <a:buAutoNum type="arabicPeriod"/>
-            </a:pPr>
-            <a:r>
-              <a:rPr lang="en-US" sz="2000" dirty="0"/>
-              <a:t>The structure of a typical AVD deployment</a:t>
-            </a:r>
-          </a:p>
-          <a:p>
-            <a:pPr marL="457200" indent="-457200">
-              <a:buFont typeface="+mj-lt"/>
-              <a:buAutoNum type="arabicPeriod"/>
-            </a:pPr>
-            <a:r>
-              <a:rPr lang="en-US" sz="2000" dirty="0"/>
-              <a:t>The required resources to make it work</a:t>
-            </a:r>
-          </a:p>
-          <a:p>
-            <a:pPr marL="457200" indent="-457200">
-              <a:buFont typeface="+mj-lt"/>
-              <a:buAutoNum type="arabicPeriod"/>
-            </a:pPr>
-            <a:r>
-              <a:rPr lang="en-US" sz="2000" dirty="0"/>
-              <a:t>The </a:t>
-            </a:r>
-            <a:r>
-              <a:rPr lang="en-US" sz="2000" dirty="0" err="1"/>
-              <a:t>IaC</a:t>
-            </a:r>
-            <a:r>
-              <a:rPr lang="en-US" sz="2000" dirty="0"/>
-              <a:t> Bicep content for each resource</a:t>
-            </a:r>
-          </a:p>
-          <a:p>
-            <a:pPr marL="457200" indent="-457200">
-              <a:buFont typeface="+mj-lt"/>
-              <a:buAutoNum type="arabicPeriod"/>
-            </a:pPr>
-            <a:r>
-              <a:rPr lang="en-US" sz="2000" dirty="0"/>
-              <a:t>How all that Bicep code work together</a:t>
-            </a:r>
-          </a:p>
-          <a:p>
-            <a:pPr marL="457200" indent="-457200">
-              <a:buFont typeface="+mj-lt"/>
-              <a:buAutoNum type="arabicPeriod"/>
-            </a:pPr>
-            <a:r>
-              <a:rPr lang="en-US" sz="2000" dirty="0"/>
-              <a:t>How to deploy it all using a </a:t>
-            </a:r>
-            <a:r>
-              <a:rPr lang="en-US" sz="2000" dirty="0" err="1"/>
-              <a:t>powershell</a:t>
-            </a:r>
-            <a:r>
-              <a:rPr lang="en-US" sz="2000" dirty="0"/>
-              <a:t> script</a:t>
-            </a:r>
-          </a:p>
-          <a:p>
-            <a:pPr marL="0" indent="0">
-              <a:buNone/>
-            </a:pPr>
-            <a:endParaRPr lang="en-US" sz="2000" dirty="0"/>
-          </a:p>
-        </p:txBody>
-      </p:sp>
-    </p:spTree>
-    <p:extLst>
-      <p:ext uri="{BB962C8B-B14F-4D97-AF65-F5344CB8AC3E}">
-        <p14:creationId xmlns:p14="http://schemas.microsoft.com/office/powerpoint/2010/main" val="4198896886"/>
-      </p:ext>
-    </p:extLst>
-  </p:cSld>
-  <p:clrMapOvr>
-    <a:masterClrMapping/>
-  </p:clrMapOvr>
-  <p:transition>
-    <p:fade/>
-  </p:transition>
-</p:sld>
-</file>
-
-<file path=ppt/slides/slide17.xml><?xml version="1.0" encoding="utf-8"?>
-<p:sld xmlns:a="http://schemas.openxmlformats.org/drawingml/2006/main" xmlns:r="http://schemas.openxmlformats.org/officeDocument/2006/relationships" xmlns:p="http://schemas.openxmlformats.org/presentationml/2006/main">
-  <p:cSld>
-    <p:spTree>
-      <p:nvGrpSpPr>
-        <p:cNvPr id="1" name=""/>
-        <p:cNvGrpSpPr/>
-        <p:nvPr/>
-      </p:nvGrpSpPr>
-      <p:grpSpPr>
-        <a:xfrm>
-          <a:off x="0" y="0"/>
-          <a:ext cx="0" cy="0"/>
-          <a:chOff x="0" y="0"/>
-          <a:chExt cx="0" cy="0"/>
-        </a:xfrm>
-      </p:grpSpPr>
-      <p:sp>
-        <p:nvSpPr>
-          <p:cNvPr id="2" name="Title 1">
-            <a:extLst>
-              <a:ext uri="{FF2B5EF4-FFF2-40B4-BE49-F238E27FC236}">
                 <a16:creationId xmlns:a16="http://schemas.microsoft.com/office/drawing/2014/main" id="{E9669AEF-D865-0342-AB7E-7902F83D5504}"/>
               </a:ext>
             </a:extLst>
@@ -57017,7 +56757,7 @@
 </p:sld>
 </file>
 
-<file path=ppt/slides/slide18.xml><?xml version="1.0" encoding="utf-8"?>
+<file path=ppt/slides/slide17.xml><?xml version="1.0" encoding="utf-8"?>
 <p:sld xmlns:a="http://schemas.openxmlformats.org/drawingml/2006/main" xmlns:r="http://schemas.openxmlformats.org/officeDocument/2006/relationships" xmlns:p="http://schemas.openxmlformats.org/presentationml/2006/main">
   <p:cSld>
     <p:spTree>
@@ -57171,7 +56911,7 @@
           <a:p>
             <a:r>
               <a:rPr lang="en-US" dirty="0"/>
-              <a:t>Agenda – Day 2</a:t>
+              <a:t>Agenda – Day 3</a:t>
             </a:r>
           </a:p>
         </p:txBody>
@@ -57202,7 +56942,7 @@
             </a:pPr>
             <a:r>
               <a:rPr lang="en-US" sz="2400" dirty="0"/>
-              <a:t>09:00 – Review of Day 1</a:t>
+              <a:t>09:00 – Review of Day 2</a:t>
             </a:r>
           </a:p>
           <a:p>
@@ -57211,7 +56951,7 @@
             </a:pPr>
             <a:r>
               <a:rPr lang="en-US" sz="2400" dirty="0"/>
-              <a:t>09:30 – Building in Bicep - AVD</a:t>
+              <a:t>09:30 – AVD Components – Lab 3</a:t>
             </a:r>
           </a:p>
           <a:p>
@@ -57229,7 +56969,7 @@
             </a:pPr>
             <a:r>
               <a:rPr lang="en-US" sz="2400" dirty="0"/>
-              <a:t>10:30 – Building in Bicep - AVD</a:t>
+              <a:t>10:30 – AVD Hosts and Testing – Lab 4</a:t>
             </a:r>
           </a:p>
           <a:p>
@@ -57253,7 +56993,7 @@
             </a:pPr>
             <a:r>
               <a:rPr lang="en-US" sz="2400" dirty="0"/>
-              <a:t>13:00 – Open Afternoon Q&amp;A</a:t>
+              <a:t>13:00 – Finish Lab 4 and Open Afternoon Q&amp;A</a:t>
             </a:r>
           </a:p>
           <a:p>
@@ -57357,7 +57097,7 @@
           <a:p>
             <a:r>
               <a:rPr lang="en-US" dirty="0"/>
-              <a:t>Workshop Day 2</a:t>
+              <a:t>Workshop Day 3</a:t>
             </a:r>
           </a:p>
         </p:txBody>
@@ -57491,19 +57231,13 @@
           <a:p>
             <a:r>
               <a:rPr lang="en-US" sz="2400" dirty="0"/>
-              <a:t>Finish the base infrastructure if required</a:t>
+              <a:t>Finish deploying the AVD components</a:t>
             </a:r>
           </a:p>
           <a:p>
             <a:r>
               <a:rPr lang="en-US" sz="2400" dirty="0"/>
-              <a:t>Deploy the AVD components</a:t>
-            </a:r>
-          </a:p>
-          <a:p>
-            <a:r>
-              <a:rPr lang="en-US" sz="2400" dirty="0"/>
-              <a:t>Connect it to AD/AADDS</a:t>
+              <a:t>Deploy the AVD hosts</a:t>
             </a:r>
           </a:p>
           <a:p>
@@ -57559,12 +57293,40 @@
           <a:chExt cx="0" cy="0"/>
         </a:xfrm>
       </p:grpSpPr>
-      <p:sp>
-        <p:nvSpPr>
-          <p:cNvPr id="2" name="Title 1">
-            <a:extLst>
-              <a:ext uri="{FF2B5EF4-FFF2-40B4-BE49-F238E27FC236}">
-                <a16:creationId xmlns:a16="http://schemas.microsoft.com/office/drawing/2014/main" id="{20D04137-ED43-1F4B-A8A8-FBBDF2B6789C}"/>
+      <p:pic>
+        <p:nvPicPr>
+          <p:cNvPr id="5" name="Picture Placeholder 4" descr="Femal software engineer works on code across three screens.">
+            <a:extLst>
+              <a:ext uri="{FF2B5EF4-FFF2-40B4-BE49-F238E27FC236}">
+                <a16:creationId xmlns:a16="http://schemas.microsoft.com/office/drawing/2014/main" id="{2C4060EA-069F-2B44-8494-5642E84F01E0}"/>
+              </a:ext>
+            </a:extLst>
+          </p:cNvPr>
+          <p:cNvPicPr>
+            <a:picLocks noGrp="1" noChangeAspect="1"/>
+          </p:cNvPicPr>
+          <p:nvPr>
+            <p:ph type="pic" sz="quarter" idx="10"/>
+          </p:nvPr>
+        </p:nvPicPr>
+        <p:blipFill>
+          <a:blip r:embed="rId2"/>
+          <a:srcRect t="7802" b="7802"/>
+          <a:stretch/>
+        </p:blipFill>
+        <p:spPr>
+          <a:xfrm>
+            <a:off x="0" y="0"/>
+            <a:ext cx="12192000" cy="6858000"/>
+          </a:xfrm>
+        </p:spPr>
+      </p:pic>
+      <p:sp>
+        <p:nvSpPr>
+          <p:cNvPr id="3" name="Title 2">
+            <a:extLst>
+              <a:ext uri="{FF2B5EF4-FFF2-40B4-BE49-F238E27FC236}">
+                <a16:creationId xmlns:a16="http://schemas.microsoft.com/office/drawing/2014/main" id="{A5A65929-7741-CE47-8BDB-61A1AD81F762}"/>
               </a:ext>
             </a:extLst>
           </p:cNvPr>
@@ -57582,42 +57344,7 @@
           <a:p>
             <a:r>
               <a:rPr lang="en-US" dirty="0"/>
-              <a:t>User Accounts</a:t>
-            </a:r>
-          </a:p>
-        </p:txBody>
-      </p:sp>
-      <p:sp>
-        <p:nvSpPr>
-          <p:cNvPr id="4" name="TextBox 3">
-            <a:extLst>
-              <a:ext uri="{FF2B5EF4-FFF2-40B4-BE49-F238E27FC236}">
-                <a16:creationId xmlns:a16="http://schemas.microsoft.com/office/drawing/2014/main" id="{BEEBB1E1-AF88-7037-A643-C340E233DFCB}"/>
-              </a:ext>
-            </a:extLst>
-          </p:cNvPr>
-          <p:cNvSpPr txBox="1"/>
-          <p:nvPr/>
-        </p:nvSpPr>
-        <p:spPr>
-          <a:xfrm>
-            <a:off x="588262" y="5685144"/>
-            <a:ext cx="11018520" cy="246221"/>
-          </a:xfrm>
-          <a:prstGeom prst="rect">
-            <a:avLst/>
-          </a:prstGeom>
-          <a:noFill/>
-        </p:spPr>
-        <p:txBody>
-          <a:bodyPr wrap="square" lIns="0" tIns="0" rIns="0" bIns="0" rtlCol="0">
-            <a:spAutoFit/>
-          </a:bodyPr>
-          <a:lstStyle/>
-          <a:p>
-            <a:r>
-              <a:rPr lang="en-GB" sz="1600" dirty="0"/>
-              <a:t>NOTE: These accounts will be destroyed at the end of the course along with any personal details associated.</a:t>
+              <a:t>Lab 3 – AVD Components (to finish)</a:t>
             </a:r>
           </a:p>
         </p:txBody>
@@ -57625,7 +57352,7 @@
     </p:spTree>
     <p:extLst>
       <p:ext uri="{BB962C8B-B14F-4D97-AF65-F5344CB8AC3E}">
-        <p14:creationId xmlns:p14="http://schemas.microsoft.com/office/powerpoint/2010/main" val="235522272"/>
+        <p14:creationId xmlns:p14="http://schemas.microsoft.com/office/powerpoint/2010/main" val="458719857"/>
       </p:ext>
     </p:extLst>
   </p:cSld>
@@ -57655,40 +57382,12 @@
           <a:chExt cx="0" cy="0"/>
         </a:xfrm>
       </p:grpSpPr>
-      <p:pic>
-        <p:nvPicPr>
-          <p:cNvPr id="5" name="Picture Placeholder 4" descr="Femal software engineer works on code across three screens.">
-            <a:extLst>
-              <a:ext uri="{FF2B5EF4-FFF2-40B4-BE49-F238E27FC236}">
-                <a16:creationId xmlns:a16="http://schemas.microsoft.com/office/drawing/2014/main" id="{2C4060EA-069F-2B44-8494-5642E84F01E0}"/>
-              </a:ext>
-            </a:extLst>
-          </p:cNvPr>
-          <p:cNvPicPr>
-            <a:picLocks noGrp="1" noChangeAspect="1"/>
-          </p:cNvPicPr>
-          <p:nvPr>
-            <p:ph type="pic" sz="quarter" idx="10"/>
-          </p:nvPr>
-        </p:nvPicPr>
-        <p:blipFill>
-          <a:blip r:embed="rId2"/>
-          <a:srcRect t="7802" b="7802"/>
-          <a:stretch/>
-        </p:blipFill>
-        <p:spPr>
-          <a:xfrm>
-            <a:off x="0" y="0"/>
-            <a:ext cx="12192000" cy="6858000"/>
-          </a:xfrm>
-        </p:spPr>
-      </p:pic>
-      <p:sp>
-        <p:nvSpPr>
-          <p:cNvPr id="3" name="Title 2">
-            <a:extLst>
-              <a:ext uri="{FF2B5EF4-FFF2-40B4-BE49-F238E27FC236}">
-                <a16:creationId xmlns:a16="http://schemas.microsoft.com/office/drawing/2014/main" id="{A5A65929-7741-CE47-8BDB-61A1AD81F762}"/>
+      <p:sp>
+        <p:nvSpPr>
+          <p:cNvPr id="2" name="Title 1">
+            <a:extLst>
+              <a:ext uri="{FF2B5EF4-FFF2-40B4-BE49-F238E27FC236}">
+                <a16:creationId xmlns:a16="http://schemas.microsoft.com/office/drawing/2014/main" id="{E9669AEF-D865-0342-AB7E-7902F83D5504}"/>
               </a:ext>
             </a:extLst>
           </p:cNvPr>
@@ -57699,22 +57398,81 @@
             <p:ph type="title"/>
           </p:nvPr>
         </p:nvSpPr>
+        <p:spPr>
+          <a:xfrm>
+            <a:off x="588263" y="585788"/>
+            <a:ext cx="4894962" cy="5683250"/>
+          </a:xfrm>
+        </p:spPr>
+        <p:txBody>
+          <a:bodyPr anchor="ctr">
+            <a:noAutofit/>
+          </a:bodyPr>
+          <a:lstStyle/>
+          <a:p>
+            <a:pPr algn="ctr"/>
+            <a:r>
+              <a:rPr lang="en-US" sz="2800" dirty="0"/>
+              <a:t>Break Time</a:t>
+            </a:r>
+            <a:br>
+              <a:rPr lang="en-US" sz="2800" dirty="0"/>
+            </a:br>
+            <a:r>
+              <a:rPr lang="en-US" sz="2800" dirty="0"/>
+              <a:t>Back in 15 mins</a:t>
+            </a:r>
+            <a:br>
+              <a:rPr lang="en-US" sz="2800" dirty="0"/>
+            </a:br>
+            <a:br>
+              <a:rPr lang="en-US" sz="2800" dirty="0"/>
+            </a:br>
+            <a:endParaRPr lang="en-US" sz="2800" dirty="0"/>
+          </a:p>
+        </p:txBody>
+      </p:sp>
+      <p:sp>
+        <p:nvSpPr>
+          <p:cNvPr id="3" name="Text Placeholder 2">
+            <a:extLst>
+              <a:ext uri="{FF2B5EF4-FFF2-40B4-BE49-F238E27FC236}">
+                <a16:creationId xmlns:a16="http://schemas.microsoft.com/office/drawing/2014/main" id="{E243B9F1-DC42-0949-BC92-F7DEEDE03CC7}"/>
+              </a:ext>
+            </a:extLst>
+          </p:cNvPr>
+          <p:cNvSpPr>
+            <a:spLocks noGrp="1"/>
+          </p:cNvSpPr>
+          <p:nvPr>
+            <p:ph type="body" sz="quarter" idx="11"/>
+          </p:nvPr>
+        </p:nvSpPr>
         <p:spPr/>
         <p:txBody>
-          <a:bodyPr/>
+          <a:bodyPr tIns="0" anchor="ctr">
+            <a:noAutofit/>
+          </a:bodyPr>
           <a:lstStyle/>
           <a:p>
             <a:r>
-              <a:rPr lang="en-US" dirty="0"/>
-              <a:t>Lets get building</a:t>
-            </a:r>
+              <a:rPr lang="en-GB" sz="2000" dirty="0"/>
+              <a:t>"Using Azure Bicep is like a carpenter using power tools for the first time. It can be scary at first, but once you get the hang of it, you'll wonder how you ever managed without it. And just like with power tools, you'll want to make sure you wear your safety glasses and have a first-aid kit handy!“</a:t>
+            </a:r>
+          </a:p>
+          <a:p>
+            <a:r>
+              <a:rPr lang="en-GB" sz="1400" dirty="0"/>
+              <a:t>Mark Russinovich, CTO of Microsoft Azure</a:t>
+            </a:r>
+            <a:endParaRPr lang="en-GB" sz="2000" dirty="0"/>
           </a:p>
         </p:txBody>
       </p:sp>
     </p:spTree>
     <p:extLst>
       <p:ext uri="{BB962C8B-B14F-4D97-AF65-F5344CB8AC3E}">
-        <p14:creationId xmlns:p14="http://schemas.microsoft.com/office/powerpoint/2010/main" val="458719857"/>
+        <p14:creationId xmlns:p14="http://schemas.microsoft.com/office/powerpoint/2010/main" val="3193254362"/>
       </p:ext>
     </p:extLst>
   </p:cSld>
@@ -57767,7 +57525,7 @@
           <a:p>
             <a:r>
               <a:rPr lang="en-US" sz="2800" dirty="0"/>
-              <a:t>Lab 2 - Base Infrastructure</a:t>
+              <a:t>AVD Components</a:t>
             </a:r>
           </a:p>
         </p:txBody>
@@ -57798,9 +57556,17 @@
             </a:pPr>
             <a:r>
               <a:rPr lang="en-US" sz="2000" b="1" dirty="0"/>
-              <a:t>Finishing off the Base Infrastructure (if required)</a:t>
-            </a:r>
-            <a:endParaRPr lang="en-US" sz="2000" dirty="0"/>
+              <a:t>And now onto the main event</a:t>
+            </a:r>
+          </a:p>
+          <a:p>
+            <a:pPr marL="0" indent="0">
+              <a:buNone/>
+            </a:pPr>
+            <a:r>
+              <a:rPr lang="en-US" sz="2000" dirty="0"/>
+              <a:t>In this lab we will build out and deploy the main components required for an AVD service including:</a:t>
+            </a:r>
           </a:p>
           <a:p>
             <a:pPr marL="457200" indent="-457200">
@@ -57809,7 +57575,7 @@
             </a:pPr>
             <a:r>
               <a:rPr lang="en-US" sz="2000" dirty="0"/>
-              <a:t>Remaining base infrastructure</a:t>
+              <a:t>AVD Host Pool</a:t>
             </a:r>
           </a:p>
           <a:p>
@@ -57819,15 +57585,31 @@
             </a:pPr>
             <a:r>
               <a:rPr lang="en-US" sz="2000" dirty="0"/>
-              <a:t>Peering (walkthrough)</a:t>
-            </a:r>
+              <a:t>AVD Workspace</a:t>
+            </a:r>
+          </a:p>
+          <a:p>
+            <a:pPr marL="457200" indent="-457200">
+              <a:buFont typeface="+mj-lt"/>
+              <a:buAutoNum type="arabicPeriod"/>
+            </a:pPr>
+            <a:r>
+              <a:rPr lang="en-US" sz="2000" dirty="0"/>
+              <a:t>AVD Application Group</a:t>
+            </a:r>
+          </a:p>
+          <a:p>
+            <a:pPr marL="0" indent="0">
+              <a:buNone/>
+            </a:pPr>
+            <a:endParaRPr lang="en-US" sz="2000" dirty="0"/>
           </a:p>
         </p:txBody>
       </p:sp>
     </p:spTree>
     <p:extLst>
       <p:ext uri="{BB962C8B-B14F-4D97-AF65-F5344CB8AC3E}">
-        <p14:creationId xmlns:p14="http://schemas.microsoft.com/office/powerpoint/2010/main" val="3480075518"/>
+        <p14:creationId xmlns:p14="http://schemas.microsoft.com/office/powerpoint/2010/main" val="1426061794"/>
       </p:ext>
     </p:extLst>
   </p:cSld>
@@ -57857,12 +57639,40 @@
           <a:chExt cx="0" cy="0"/>
         </a:xfrm>
       </p:grpSpPr>
-      <p:sp>
-        <p:nvSpPr>
-          <p:cNvPr id="2" name="Title 1">
-            <a:extLst>
-              <a:ext uri="{FF2B5EF4-FFF2-40B4-BE49-F238E27FC236}">
-                <a16:creationId xmlns:a16="http://schemas.microsoft.com/office/drawing/2014/main" id="{E9669AEF-D865-0342-AB7E-7902F83D5504}"/>
+      <p:pic>
+        <p:nvPicPr>
+          <p:cNvPr id="5" name="Picture Placeholder 4" descr="Femal software engineer works on code across three screens.">
+            <a:extLst>
+              <a:ext uri="{FF2B5EF4-FFF2-40B4-BE49-F238E27FC236}">
+                <a16:creationId xmlns:a16="http://schemas.microsoft.com/office/drawing/2014/main" id="{2C4060EA-069F-2B44-8494-5642E84F01E0}"/>
+              </a:ext>
+            </a:extLst>
+          </p:cNvPr>
+          <p:cNvPicPr>
+            <a:picLocks noGrp="1" noChangeAspect="1"/>
+          </p:cNvPicPr>
+          <p:nvPr>
+            <p:ph type="pic" sz="quarter" idx="10"/>
+          </p:nvPr>
+        </p:nvPicPr>
+        <p:blipFill>
+          <a:blip r:embed="rId2"/>
+          <a:srcRect t="7802" b="7802"/>
+          <a:stretch/>
+        </p:blipFill>
+        <p:spPr>
+          <a:xfrm>
+            <a:off x="0" y="0"/>
+            <a:ext cx="12192000" cy="6858000"/>
+          </a:xfrm>
+        </p:spPr>
+      </p:pic>
+      <p:sp>
+        <p:nvSpPr>
+          <p:cNvPr id="3" name="Title 2">
+            <a:extLst>
+              <a:ext uri="{FF2B5EF4-FFF2-40B4-BE49-F238E27FC236}">
+                <a16:creationId xmlns:a16="http://schemas.microsoft.com/office/drawing/2014/main" id="{A5A65929-7741-CE47-8BDB-61A1AD81F762}"/>
               </a:ext>
             </a:extLst>
           </p:cNvPr>
@@ -57873,84 +57683,22 @@
             <p:ph type="title"/>
           </p:nvPr>
         </p:nvSpPr>
-        <p:spPr>
-          <a:xfrm>
-            <a:off x="588263" y="585788"/>
-            <a:ext cx="4894962" cy="5683250"/>
-          </a:xfrm>
-        </p:spPr>
-        <p:txBody>
-          <a:bodyPr anchor="ctr">
-            <a:noAutofit/>
-          </a:bodyPr>
+        <p:spPr/>
+        <p:txBody>
+          <a:bodyPr/>
           <a:lstStyle/>
           <a:p>
-            <a:pPr algn="ctr"/>
-            <a:r>
-              <a:rPr lang="en-US" sz="2800" dirty="0"/>
-              <a:t>Break Time</a:t>
-            </a:r>
-            <a:br>
-              <a:rPr lang="en-US" sz="2800" dirty="0"/>
-            </a:br>
-            <a:r>
-              <a:rPr lang="en-US" sz="2800" dirty="0"/>
-              <a:t>Back in 15 mins</a:t>
-            </a:r>
-            <a:br>
-              <a:rPr lang="en-US" sz="2800" dirty="0"/>
-            </a:br>
-            <a:br>
-              <a:rPr lang="en-US" sz="2800" dirty="0"/>
-            </a:br>
-            <a:r>
-              <a:rPr lang="en-US" sz="2800" dirty="0"/>
-              <a:t>see you at 10:30</a:t>
-            </a:r>
-          </a:p>
-        </p:txBody>
-      </p:sp>
-      <p:sp>
-        <p:nvSpPr>
-          <p:cNvPr id="3" name="Text Placeholder 2">
-            <a:extLst>
-              <a:ext uri="{FF2B5EF4-FFF2-40B4-BE49-F238E27FC236}">
-                <a16:creationId xmlns:a16="http://schemas.microsoft.com/office/drawing/2014/main" id="{E243B9F1-DC42-0949-BC92-F7DEEDE03CC7}"/>
-              </a:ext>
-            </a:extLst>
-          </p:cNvPr>
-          <p:cNvSpPr>
-            <a:spLocks noGrp="1"/>
-          </p:cNvSpPr>
-          <p:nvPr>
-            <p:ph type="body" sz="quarter" idx="11"/>
-          </p:nvPr>
-        </p:nvSpPr>
-        <p:spPr/>
-        <p:txBody>
-          <a:bodyPr tIns="0" anchor="ctr">
-            <a:noAutofit/>
-          </a:bodyPr>
-          <a:lstStyle/>
-          <a:p>
-            <a:r>
-              <a:rPr lang="en-GB" sz="2000" dirty="0"/>
-              <a:t>"Using Azure Bicep is like a carpenter using power tools for the first time. It can be scary at first, but once you get the hang of it, you'll wonder how you ever managed without it. And just like with power tools, you'll want to make sure you wear your safety glasses and have a first-aid kit handy!“</a:t>
-            </a:r>
-          </a:p>
-          <a:p>
-            <a:r>
-              <a:rPr lang="en-GB" sz="1400" dirty="0"/>
-              <a:t>Mark Russinovich, CTO of Microsoft Azure</a:t>
-            </a:r>
-            <a:endParaRPr lang="en-GB" sz="2000" dirty="0"/>
+            <a:r>
+              <a:rPr lang="en-US" dirty="0"/>
+              <a:t>Lab 4 – AVD Hosts</a:t>
+            </a:r>
           </a:p>
         </p:txBody>
       </p:sp>
     </p:spTree>
     <p:extLst>
       <p:ext uri="{BB962C8B-B14F-4D97-AF65-F5344CB8AC3E}">
-        <p14:creationId xmlns:p14="http://schemas.microsoft.com/office/powerpoint/2010/main" val="3193254362"/>
+        <p14:creationId xmlns:p14="http://schemas.microsoft.com/office/powerpoint/2010/main" val="4069404700"/>
       </p:ext>
     </p:extLst>
   </p:cSld>
@@ -58003,7 +57751,7 @@
           <a:p>
             <a:r>
               <a:rPr lang="en-US" sz="2800" dirty="0"/>
-              <a:t>Lab 3 - AVD Infrastructure</a:t>
+              <a:t>AVD Hosts</a:t>
             </a:r>
           </a:p>
         </p:txBody>
@@ -58034,7 +57782,7 @@
             </a:pPr>
             <a:r>
               <a:rPr lang="en-US" sz="2000" b="1" dirty="0"/>
-              <a:t>And now onto the main event</a:t>
+              <a:t>The Final Lab</a:t>
             </a:r>
           </a:p>
           <a:p>
@@ -58043,7 +57791,7 @@
             </a:pPr>
             <a:r>
               <a:rPr lang="en-US" sz="2000" dirty="0"/>
-              <a:t>In this lab we will build out and deploy the main components required for an AVD service including:</a:t>
+              <a:t>In this final lab we will be building out the AVD hosts and adding them to the Host Pool</a:t>
             </a:r>
           </a:p>
           <a:p>
@@ -58053,7 +57801,7 @@
             </a:pPr>
             <a:r>
               <a:rPr lang="en-US" sz="2000" dirty="0"/>
-              <a:t>AVD Host Pool</a:t>
+              <a:t>Add Hosts</a:t>
             </a:r>
           </a:p>
           <a:p>
@@ -58063,7 +57811,7 @@
             </a:pPr>
             <a:r>
               <a:rPr lang="en-US" sz="2000" dirty="0"/>
-              <a:t>AVD Workspace</a:t>
+              <a:t>Add extensions</a:t>
             </a:r>
           </a:p>
           <a:p>
@@ -58073,7 +57821,17 @@
             </a:pPr>
             <a:r>
               <a:rPr lang="en-US" sz="2000" dirty="0"/>
-              <a:t>AVD Application Group</a:t>
+              <a:t>Test it all works – log into your own AVD desktop</a:t>
+            </a:r>
+          </a:p>
+          <a:p>
+            <a:pPr marL="457200" indent="-457200">
+              <a:buFont typeface="+mj-lt"/>
+              <a:buAutoNum type="arabicPeriod"/>
+            </a:pPr>
+            <a:r>
+              <a:rPr lang="en-US" sz="2000" dirty="0"/>
+              <a:t>Party!</a:t>
             </a:r>
           </a:p>
           <a:p>
@@ -58087,7 +57845,7 @@
     </p:spTree>
     <p:extLst>
       <p:ext uri="{BB962C8B-B14F-4D97-AF65-F5344CB8AC3E}">
-        <p14:creationId xmlns:p14="http://schemas.microsoft.com/office/powerpoint/2010/main" val="1426061794"/>
+        <p14:creationId xmlns:p14="http://schemas.microsoft.com/office/powerpoint/2010/main" val="2111296362"/>
       </p:ext>
     </p:extLst>
   </p:cSld>
@@ -59180,15 +58938,6 @@
 </file>
 
 <file path=customXml/item1.xml><?xml version="1.0" encoding="utf-8"?>
-<?mso-contentType ?>
-<FormTemplates xmlns="http://schemas.microsoft.com/sharepoint/v3/contenttype/forms">
-  <Display>DocumentLibraryForm</Display>
-  <Edit>DocumentLibraryForm</Edit>
-  <New>DocumentLibraryForm</New>
-</FormTemplates>
-</file>
-
-<file path=customXml/item2.xml><?xml version="1.0" encoding="utf-8"?>
 <p:properties xmlns:p="http://schemas.microsoft.com/office/2006/metadata/properties" xmlns:xsi="http://www.w3.org/2001/XMLSchema-instance" xmlns:pc="http://schemas.microsoft.com/office/infopath/2007/PartnerControls">
   <documentManagement>
     <_ip_UnifiedCompliancePolicyUIAction xmlns="http://schemas.microsoft.com/sharepoint/v3" xsi:nil="true"/>
@@ -59196,6 +58945,15 @@
     <_ip_UnifiedCompliancePolicyProperties xmlns="http://schemas.microsoft.com/sharepoint/v3" xsi:nil="true"/>
   </documentManagement>
 </p:properties>
+</file>
+
+<file path=customXml/item2.xml><?xml version="1.0" encoding="utf-8"?>
+<?mso-contentType ?>
+<FormTemplates xmlns="http://schemas.microsoft.com/sharepoint/v3/contenttype/forms">
+  <Display>DocumentLibraryForm</Display>
+  <Edit>DocumentLibraryForm</Edit>
+  <New>DocumentLibraryForm</New>
+</FormTemplates>
 </file>
 
 <file path=customXml/item3.xml><?xml version="1.0" encoding="utf-8"?>
@@ -59439,20 +59197,20 @@
 </file>
 
 <file path=customXml/itemProps1.xml><?xml version="1.0" encoding="utf-8"?>
-<ds:datastoreItem xmlns:ds="http://schemas.openxmlformats.org/officeDocument/2006/customXml" ds:itemID="{80773F8E-CD3C-401D-81D0-68F54DCC798C}">
-  <ds:schemaRefs>
-    <ds:schemaRef ds:uri="http://schemas.microsoft.com/sharepoint/v3/contenttype/forms"/>
-  </ds:schemaRefs>
-</ds:datastoreItem>
-</file>
-
-<file path=customXml/itemProps2.xml><?xml version="1.0" encoding="utf-8"?>
 <ds:datastoreItem xmlns:ds="http://schemas.openxmlformats.org/officeDocument/2006/customXml" ds:itemID="{561B1131-15CA-429C-B875-56F79CD6C674}">
   <ds:schemaRefs>
     <ds:schemaRef ds:uri="http://schemas.microsoft.com/office/2006/metadata/properties"/>
     <ds:schemaRef ds:uri="http://schemas.microsoft.com/office/infopath/2007/PartnerControls"/>
     <ds:schemaRef ds:uri="http://schemas.microsoft.com/sharepoint/v3"/>
     <ds:schemaRef ds:uri="492b655a-ec86-4731-b25e-ce4ddeb8f50a"/>
+  </ds:schemaRefs>
+</ds:datastoreItem>
+</file>
+
+<file path=customXml/itemProps2.xml><?xml version="1.0" encoding="utf-8"?>
+<ds:datastoreItem xmlns:ds="http://schemas.openxmlformats.org/officeDocument/2006/customXml" ds:itemID="{80773F8E-CD3C-401D-81D0-68F54DCC798C}">
+  <ds:schemaRefs>
+    <ds:schemaRef ds:uri="http://schemas.microsoft.com/sharepoint/v3/contenttype/forms"/>
   </ds:schemaRefs>
 </ds:datastoreItem>
 </file>

</xml_diff>